<commit_message>
Updated Power Point mockup with results of today's meeting with Ester (MA Backoffice).
</commit_message>
<xml_diff>
--- a/documentation/2022-03-29_MAP-structure-draft.pptx
+++ b/documentation/2022-03-29_MAP-structure-draft.pptx
@@ -6,13 +6,14 @@
   </p:sldMasterIdLst>
   <p:sldIdLst>
     <p:sldId id="269" r:id="rId2"/>
-    <p:sldId id="271" r:id="rId3"/>
-    <p:sldId id="268" r:id="rId4"/>
-    <p:sldId id="265" r:id="rId5"/>
-    <p:sldId id="263" r:id="rId6"/>
-    <p:sldId id="261" r:id="rId7"/>
-    <p:sldId id="262" r:id="rId8"/>
-    <p:sldId id="260" r:id="rId9"/>
+    <p:sldId id="272" r:id="rId3"/>
+    <p:sldId id="271" r:id="rId4"/>
+    <p:sldId id="268" r:id="rId5"/>
+    <p:sldId id="265" r:id="rId6"/>
+    <p:sldId id="263" r:id="rId7"/>
+    <p:sldId id="261" r:id="rId8"/>
+    <p:sldId id="262" r:id="rId9"/>
+    <p:sldId id="260" r:id="rId10"/>
   </p:sldIdLst>
   <p:sldSz cx="12192000" cy="6858000"/>
   <p:notesSz cx="6858000" cy="9144000"/>
@@ -3641,6 +3642,710 @@
           <a:chExt cx="0" cy="0"/>
         </a:xfrm>
       </p:grpSpPr>
+      <p:pic>
+        <p:nvPicPr>
+          <p:cNvPr id="21" name="Grafik 20">
+            <a:extLst>
+              <a:ext uri="{FF2B5EF4-FFF2-40B4-BE49-F238E27FC236}">
+                <a16:creationId xmlns:a16="http://schemas.microsoft.com/office/drawing/2014/main" id="{0195732E-D772-4F81-A9E3-B9A6EB9EAF9B}"/>
+              </a:ext>
+            </a:extLst>
+          </p:cNvPr>
+          <p:cNvPicPr>
+            <a:picLocks noChangeAspect="1"/>
+          </p:cNvPicPr>
+          <p:nvPr/>
+        </p:nvPicPr>
+        <p:blipFill>
+          <a:blip r:embed="rId2"/>
+          <a:stretch>
+            <a:fillRect/>
+          </a:stretch>
+        </p:blipFill>
+        <p:spPr>
+          <a:xfrm>
+            <a:off x="186404" y="1856820"/>
+            <a:ext cx="8823310" cy="3640719"/>
+          </a:xfrm>
+          <a:prstGeom prst="rect">
+            <a:avLst/>
+          </a:prstGeom>
+          <a:ln>
+            <a:solidFill>
+              <a:schemeClr val="tx1"/>
+            </a:solidFill>
+          </a:ln>
+        </p:spPr>
+      </p:pic>
+      <p:sp>
+        <p:nvSpPr>
+          <p:cNvPr id="16" name="Textfeld 15">
+            <a:extLst>
+              <a:ext uri="{FF2B5EF4-FFF2-40B4-BE49-F238E27FC236}">
+                <a16:creationId xmlns:a16="http://schemas.microsoft.com/office/drawing/2014/main" id="{3D4985D2-5FEC-46A0-BB8A-D69492C1F545}"/>
+              </a:ext>
+            </a:extLst>
+          </p:cNvPr>
+          <p:cNvSpPr txBox="1"/>
+          <p:nvPr/>
+        </p:nvSpPr>
+        <p:spPr>
+          <a:xfrm>
+            <a:off x="5520779" y="833939"/>
+            <a:ext cx="2057523" cy="2862322"/>
+          </a:xfrm>
+          <a:prstGeom prst="rect">
+            <a:avLst/>
+          </a:prstGeom>
+          <a:solidFill>
+            <a:schemeClr val="bg1"/>
+          </a:solidFill>
+          <a:ln>
+            <a:solidFill>
+              <a:schemeClr val="tx1"/>
+            </a:solidFill>
+          </a:ln>
+        </p:spPr>
+        <p:txBody>
+          <a:bodyPr wrap="square" rtlCol="0">
+            <a:spAutoFit/>
+          </a:bodyPr>
+          <a:lstStyle/>
+          <a:p>
+            <a:pPr marL="285750" indent="-285750">
+              <a:buFont typeface="Arial" panose="020B0604020202020204" pitchFamily="34" charset="0"/>
+              <a:buChar char="•"/>
+            </a:pPr>
+            <a:r>
+              <a:rPr lang="de-DE" dirty="0" err="1" smtClean="0"/>
+              <a:t>Documentation</a:t>
+            </a:r>
+            <a:endParaRPr lang="de-DE" dirty="0" smtClean="0"/>
+          </a:p>
+          <a:p>
+            <a:pPr marL="285750" indent="-285750">
+              <a:buFont typeface="Arial" panose="020B0604020202020204" pitchFamily="34" charset="0"/>
+              <a:buChar char="•"/>
+            </a:pPr>
+            <a:r>
+              <a:rPr lang="en-US" dirty="0"/>
+              <a:t>Use cases and industrial </a:t>
+            </a:r>
+            <a:r>
+              <a:rPr lang="en-US" dirty="0" smtClean="0"/>
+              <a:t>references</a:t>
+            </a:r>
+          </a:p>
+          <a:p>
+            <a:pPr marL="285750" indent="-285750">
+              <a:buFont typeface="Arial" panose="020B0604020202020204" pitchFamily="34" charset="0"/>
+              <a:buChar char="•"/>
+            </a:pPr>
+            <a:r>
+              <a:rPr lang="en-US" dirty="0"/>
+              <a:t>MAP </a:t>
+            </a:r>
+            <a:r>
+              <a:rPr lang="en-US" dirty="0" err="1"/>
+              <a:t>eFMI</a:t>
+            </a:r>
+            <a:r>
+              <a:rPr lang="en-US" dirty="0"/>
+              <a:t> published </a:t>
+            </a:r>
+            <a:r>
+              <a:rPr lang="en-US" dirty="0" smtClean="0"/>
+              <a:t>tooling</a:t>
+            </a:r>
+          </a:p>
+          <a:p>
+            <a:pPr marL="285750" indent="-285750">
+              <a:buFont typeface="Arial" panose="020B0604020202020204" pitchFamily="34" charset="0"/>
+              <a:buChar char="•"/>
+            </a:pPr>
+            <a:r>
+              <a:rPr lang="en-US" dirty="0"/>
+              <a:t>Example </a:t>
+            </a:r>
+            <a:r>
+              <a:rPr lang="en-US" dirty="0" err="1" smtClean="0"/>
+              <a:t>eFMUs</a:t>
+            </a:r>
+            <a:endParaRPr lang="en-US" dirty="0" smtClean="0"/>
+          </a:p>
+          <a:p>
+            <a:pPr marL="285750" indent="-285750">
+              <a:buFont typeface="Arial" panose="020B0604020202020204" pitchFamily="34" charset="0"/>
+              <a:buChar char="•"/>
+            </a:pPr>
+            <a:r>
+              <a:rPr lang="en-US" dirty="0"/>
+              <a:t>Project </a:t>
+            </a:r>
+            <a:r>
+              <a:rPr lang="en-US" dirty="0" smtClean="0"/>
+              <a:t>organization</a:t>
+            </a:r>
+            <a:endParaRPr lang="en-US" dirty="0"/>
+          </a:p>
+        </p:txBody>
+      </p:sp>
+      <p:sp>
+        <p:nvSpPr>
+          <p:cNvPr id="29" name="Textfeld 28">
+            <a:extLst>
+              <a:ext uri="{FF2B5EF4-FFF2-40B4-BE49-F238E27FC236}">
+                <a16:creationId xmlns:a16="http://schemas.microsoft.com/office/drawing/2014/main" id="{C2C4F818-EDEB-43A2-918D-B21CA6A60BF8}"/>
+              </a:ext>
+            </a:extLst>
+          </p:cNvPr>
+          <p:cNvSpPr txBox="1"/>
+          <p:nvPr/>
+        </p:nvSpPr>
+        <p:spPr>
+          <a:xfrm>
+            <a:off x="9335141" y="850203"/>
+            <a:ext cx="1704975" cy="923330"/>
+          </a:xfrm>
+          <a:prstGeom prst="rect">
+            <a:avLst/>
+          </a:prstGeom>
+          <a:noFill/>
+          <a:ln>
+            <a:solidFill>
+              <a:schemeClr val="tx1"/>
+            </a:solidFill>
+          </a:ln>
+        </p:spPr>
+        <p:txBody>
+          <a:bodyPr wrap="square" rtlCol="0">
+            <a:spAutoFit/>
+          </a:bodyPr>
+          <a:lstStyle/>
+          <a:p>
+            <a:pPr marL="285750" indent="-285750">
+              <a:buFont typeface="Arial" panose="020B0604020202020204" pitchFamily="34" charset="0"/>
+              <a:buChar char="•"/>
+            </a:pPr>
+            <a:r>
+              <a:rPr lang="de-DE" dirty="0" err="1" smtClean="0"/>
+              <a:t>History</a:t>
+            </a:r>
+            <a:endParaRPr lang="de-DE" dirty="0" smtClean="0"/>
+          </a:p>
+          <a:p>
+            <a:pPr marL="285750" indent="-285750">
+              <a:buFont typeface="Arial" panose="020B0604020202020204" pitchFamily="34" charset="0"/>
+              <a:buChar char="•"/>
+            </a:pPr>
+            <a:r>
+              <a:rPr lang="de-DE" dirty="0"/>
+              <a:t>Legal </a:t>
+            </a:r>
+            <a:r>
+              <a:rPr lang="de-DE" dirty="0" err="1" smtClean="0"/>
+              <a:t>information</a:t>
+            </a:r>
+            <a:endParaRPr lang="de-DE" dirty="0"/>
+          </a:p>
+        </p:txBody>
+      </p:sp>
+      <p:cxnSp>
+        <p:nvCxnSpPr>
+          <p:cNvPr id="10" name="Gerader Verbinder 9">
+            <a:extLst>
+              <a:ext uri="{FF2B5EF4-FFF2-40B4-BE49-F238E27FC236}">
+                <a16:creationId xmlns:a16="http://schemas.microsoft.com/office/drawing/2014/main" id="{CD7BA7FB-5C06-4EC5-B2C8-F371A73A4FFF}"/>
+              </a:ext>
+            </a:extLst>
+          </p:cNvPr>
+          <p:cNvCxnSpPr>
+            <a:cxnSpLocks/>
+            <a:endCxn id="21" idx="0"/>
+          </p:cNvCxnSpPr>
+          <p:nvPr/>
+        </p:nvCxnSpPr>
+        <p:spPr>
+          <a:xfrm>
+            <a:off x="934995" y="966535"/>
+            <a:ext cx="3663064" cy="890285"/>
+          </a:xfrm>
+          <a:prstGeom prst="line">
+            <a:avLst/>
+          </a:prstGeom>
+          <a:ln>
+            <a:solidFill>
+              <a:schemeClr val="tx1"/>
+            </a:solidFill>
+          </a:ln>
+        </p:spPr>
+        <p:style>
+          <a:lnRef idx="1">
+            <a:schemeClr val="accent1"/>
+          </a:lnRef>
+          <a:fillRef idx="0">
+            <a:schemeClr val="accent1"/>
+          </a:fillRef>
+          <a:effectRef idx="0">
+            <a:schemeClr val="accent1"/>
+          </a:effectRef>
+          <a:fontRef idx="minor">
+            <a:schemeClr val="tx1"/>
+          </a:fontRef>
+        </p:style>
+      </p:cxnSp>
+      <p:grpSp>
+        <p:nvGrpSpPr>
+          <p:cNvPr id="23" name="Gruppieren 22">
+            <a:extLst>
+              <a:ext uri="{FF2B5EF4-FFF2-40B4-BE49-F238E27FC236}">
+                <a16:creationId xmlns:a16="http://schemas.microsoft.com/office/drawing/2014/main" id="{3B50AE8F-499C-44CF-81CF-F9DE7B420DC5}"/>
+              </a:ext>
+            </a:extLst>
+          </p:cNvPr>
+          <p:cNvGrpSpPr/>
+          <p:nvPr/>
+        </p:nvGrpSpPr>
+        <p:grpSpPr>
+          <a:xfrm>
+            <a:off x="441651" y="364538"/>
+            <a:ext cx="11394450" cy="601997"/>
+            <a:chOff x="441651" y="364538"/>
+            <a:chExt cx="11394450" cy="601997"/>
+          </a:xfrm>
+        </p:grpSpPr>
+        <p:pic>
+          <p:nvPicPr>
+            <p:cNvPr id="25" name="Grafik 24">
+              <a:extLst>
+                <a:ext uri="{FF2B5EF4-FFF2-40B4-BE49-F238E27FC236}">
+                  <a16:creationId xmlns:a16="http://schemas.microsoft.com/office/drawing/2014/main" id="{85119939-EDFA-430E-A79E-A6CCB91C083E}"/>
+                </a:ext>
+              </a:extLst>
+            </p:cNvPr>
+            <p:cNvPicPr>
+              <a:picLocks noChangeAspect="1"/>
+            </p:cNvPicPr>
+            <p:nvPr/>
+          </p:nvPicPr>
+          <p:blipFill rotWithShape="1">
+            <a:blip r:embed="rId3" cstate="hqprint">
+              <a:extLst>
+                <a:ext uri="{28A0092B-C50C-407E-A947-70E740481C1C}">
+                  <a14:useLocalDpi xmlns:a14="http://schemas.microsoft.com/office/drawing/2010/main" val="0"/>
+                </a:ext>
+              </a:extLst>
+            </a:blip>
+            <a:srcRect r="60746"/>
+            <a:stretch/>
+          </p:blipFill>
+          <p:spPr>
+            <a:xfrm>
+              <a:off x="441651" y="364538"/>
+              <a:ext cx="986688" cy="601997"/>
+            </a:xfrm>
+            <a:prstGeom prst="rect">
+              <a:avLst/>
+            </a:prstGeom>
+          </p:spPr>
+        </p:pic>
+        <p:pic>
+          <p:nvPicPr>
+            <p:cNvPr id="26" name="Grafik 25">
+              <a:extLst>
+                <a:ext uri="{FF2B5EF4-FFF2-40B4-BE49-F238E27FC236}">
+                  <a16:creationId xmlns:a16="http://schemas.microsoft.com/office/drawing/2014/main" id="{4D80DAF8-92BA-411D-9D65-1F6582CD260A}"/>
+                </a:ext>
+              </a:extLst>
+            </p:cNvPr>
+            <p:cNvPicPr>
+              <a:picLocks noChangeAspect="1"/>
+            </p:cNvPicPr>
+            <p:nvPr/>
+          </p:nvPicPr>
+          <p:blipFill>
+            <a:blip r:embed="rId4" cstate="hqprint">
+              <a:extLst>
+                <a:ext uri="{28A0092B-C50C-407E-A947-70E740481C1C}">
+                  <a14:useLocalDpi xmlns:a14="http://schemas.microsoft.com/office/drawing/2010/main" val="0"/>
+                </a:ext>
+              </a:extLst>
+            </a:blip>
+            <a:stretch>
+              <a:fillRect/>
+            </a:stretch>
+          </p:blipFill>
+          <p:spPr>
+            <a:xfrm>
+              <a:off x="10849413" y="364538"/>
+              <a:ext cx="986688" cy="469401"/>
+            </a:xfrm>
+            <a:prstGeom prst="rect">
+              <a:avLst/>
+            </a:prstGeom>
+          </p:spPr>
+        </p:pic>
+        <p:pic>
+          <p:nvPicPr>
+            <p:cNvPr id="27" name="Grafik 26">
+              <a:extLst>
+                <a:ext uri="{FF2B5EF4-FFF2-40B4-BE49-F238E27FC236}">
+                  <a16:creationId xmlns:a16="http://schemas.microsoft.com/office/drawing/2014/main" id="{4DA6220C-59D5-4E26-8C64-F378580DA4AE}"/>
+                </a:ext>
+              </a:extLst>
+            </p:cNvPr>
+            <p:cNvPicPr>
+              <a:picLocks noChangeAspect="1"/>
+            </p:cNvPicPr>
+            <p:nvPr/>
+          </p:nvPicPr>
+          <p:blipFill>
+            <a:blip r:embed="rId5"/>
+            <a:stretch>
+              <a:fillRect/>
+            </a:stretch>
+          </p:blipFill>
+          <p:spPr>
+            <a:xfrm>
+              <a:off x="10367387" y="439868"/>
+              <a:ext cx="396274" cy="426757"/>
+            </a:xfrm>
+            <a:prstGeom prst="rect">
+              <a:avLst/>
+            </a:prstGeom>
+          </p:spPr>
+        </p:pic>
+        <p:sp>
+          <p:nvSpPr>
+            <p:cNvPr id="28" name="Textfeld 27">
+              <a:extLst>
+                <a:ext uri="{FF2B5EF4-FFF2-40B4-BE49-F238E27FC236}">
+                  <a16:creationId xmlns:a16="http://schemas.microsoft.com/office/drawing/2014/main" id="{3E6BF4A1-3C38-40CE-A54C-31D5D8436193}"/>
+                </a:ext>
+              </a:extLst>
+            </p:cNvPr>
+            <p:cNvSpPr txBox="1"/>
+            <p:nvPr/>
+          </p:nvSpPr>
+          <p:spPr>
+            <a:xfrm>
+              <a:off x="4888724" y="480871"/>
+              <a:ext cx="946491" cy="369332"/>
+            </a:xfrm>
+            <a:prstGeom prst="rect">
+              <a:avLst/>
+            </a:prstGeom>
+            <a:solidFill>
+              <a:schemeClr val="bg1"/>
+            </a:solidFill>
+            <a:ln>
+              <a:solidFill>
+                <a:schemeClr val="tx1"/>
+              </a:solidFill>
+            </a:ln>
+          </p:spPr>
+          <p:txBody>
+            <a:bodyPr wrap="square" rtlCol="0">
+              <a:spAutoFit/>
+            </a:bodyPr>
+            <a:lstStyle/>
+            <a:p>
+              <a:r>
+                <a:rPr lang="de-DE" dirty="0"/>
+                <a:t>Tools</a:t>
+              </a:r>
+            </a:p>
+          </p:txBody>
+        </p:sp>
+        <p:sp>
+          <p:nvSpPr>
+            <p:cNvPr id="30" name="Textfeld 29">
+              <a:extLst>
+                <a:ext uri="{FF2B5EF4-FFF2-40B4-BE49-F238E27FC236}">
+                  <a16:creationId xmlns:a16="http://schemas.microsoft.com/office/drawing/2014/main" id="{BB2DEA15-2AF5-469E-8F2C-6FB00411C759}"/>
+                </a:ext>
+              </a:extLst>
+            </p:cNvPr>
+            <p:cNvSpPr txBox="1"/>
+            <p:nvPr/>
+          </p:nvSpPr>
+          <p:spPr>
+            <a:xfrm>
+              <a:off x="5521569" y="480871"/>
+              <a:ext cx="1266093" cy="369332"/>
+            </a:xfrm>
+            <a:prstGeom prst="rect">
+              <a:avLst/>
+            </a:prstGeom>
+            <a:solidFill>
+              <a:schemeClr val="bg1"/>
+            </a:solidFill>
+            <a:ln>
+              <a:solidFill>
+                <a:schemeClr val="tx1"/>
+              </a:solidFill>
+            </a:ln>
+          </p:spPr>
+          <p:txBody>
+            <a:bodyPr wrap="square" rtlCol="0">
+              <a:spAutoFit/>
+            </a:bodyPr>
+            <a:lstStyle/>
+            <a:p>
+              <a:r>
+                <a:rPr lang="de-DE" dirty="0"/>
+                <a:t>Resources</a:t>
+              </a:r>
+            </a:p>
+          </p:txBody>
+        </p:sp>
+        <p:sp>
+          <p:nvSpPr>
+            <p:cNvPr id="31" name="Textfeld 30">
+              <a:extLst>
+                <a:ext uri="{FF2B5EF4-FFF2-40B4-BE49-F238E27FC236}">
+                  <a16:creationId xmlns:a16="http://schemas.microsoft.com/office/drawing/2014/main" id="{0E998D3D-A71D-4906-98AD-92BBF1B45CD5}"/>
+                </a:ext>
+              </a:extLst>
+            </p:cNvPr>
+            <p:cNvSpPr txBox="1"/>
+            <p:nvPr/>
+          </p:nvSpPr>
+          <p:spPr>
+            <a:xfrm>
+              <a:off x="6632372" y="480871"/>
+              <a:ext cx="1905612" cy="369332"/>
+            </a:xfrm>
+            <a:prstGeom prst="rect">
+              <a:avLst/>
+            </a:prstGeom>
+            <a:solidFill>
+              <a:schemeClr val="bg1"/>
+            </a:solidFill>
+            <a:ln>
+              <a:solidFill>
+                <a:schemeClr val="tx1"/>
+              </a:solidFill>
+            </a:ln>
+          </p:spPr>
+          <p:txBody>
+            <a:bodyPr wrap="square" rtlCol="0">
+              <a:spAutoFit/>
+            </a:bodyPr>
+            <a:lstStyle/>
+            <a:p>
+              <a:r>
+                <a:rPr lang="de-DE" dirty="0"/>
+                <a:t>News and Events</a:t>
+              </a:r>
+            </a:p>
+          </p:txBody>
+        </p:sp>
+        <p:sp>
+          <p:nvSpPr>
+            <p:cNvPr id="38" name="Textfeld 37">
+              <a:extLst>
+                <a:ext uri="{FF2B5EF4-FFF2-40B4-BE49-F238E27FC236}">
+                  <a16:creationId xmlns:a16="http://schemas.microsoft.com/office/drawing/2014/main" id="{A8D7E10C-FD2B-4F9F-8CD0-C39294F7C55F}"/>
+                </a:ext>
+              </a:extLst>
+            </p:cNvPr>
+            <p:cNvSpPr txBox="1"/>
+            <p:nvPr/>
+          </p:nvSpPr>
+          <p:spPr>
+            <a:xfrm>
+              <a:off x="9335141" y="480871"/>
+              <a:ext cx="975370" cy="369332"/>
+            </a:xfrm>
+            <a:prstGeom prst="rect">
+              <a:avLst/>
+            </a:prstGeom>
+            <a:solidFill>
+              <a:schemeClr val="bg1"/>
+            </a:solidFill>
+            <a:ln>
+              <a:solidFill>
+                <a:schemeClr val="tx1"/>
+              </a:solidFill>
+            </a:ln>
+          </p:spPr>
+          <p:txBody>
+            <a:bodyPr wrap="square" rtlCol="0">
+              <a:spAutoFit/>
+            </a:bodyPr>
+            <a:lstStyle/>
+            <a:p>
+              <a:r>
+                <a:rPr lang="de-DE" dirty="0"/>
+                <a:t>About</a:t>
+              </a:r>
+            </a:p>
+          </p:txBody>
+        </p:sp>
+        <p:sp>
+          <p:nvSpPr>
+            <p:cNvPr id="40" name="Textfeld 39">
+              <a:extLst>
+                <a:ext uri="{FF2B5EF4-FFF2-40B4-BE49-F238E27FC236}">
+                  <a16:creationId xmlns:a16="http://schemas.microsoft.com/office/drawing/2014/main" id="{F6E91EC2-75A4-436A-9CED-E60FCEFFF8CB}"/>
+                </a:ext>
+              </a:extLst>
+            </p:cNvPr>
+            <p:cNvSpPr txBox="1"/>
+            <p:nvPr/>
+          </p:nvSpPr>
+          <p:spPr>
+            <a:xfrm>
+              <a:off x="3151485" y="480871"/>
+              <a:ext cx="1736449" cy="369332"/>
+            </a:xfrm>
+            <a:prstGeom prst="rect">
+              <a:avLst/>
+            </a:prstGeom>
+            <a:solidFill>
+              <a:schemeClr val="bg1"/>
+            </a:solidFill>
+            <a:ln>
+              <a:solidFill>
+                <a:schemeClr val="tx1"/>
+              </a:solidFill>
+            </a:ln>
+          </p:spPr>
+          <p:txBody>
+            <a:bodyPr wrap="square" rtlCol="0">
+              <a:spAutoFit/>
+            </a:bodyPr>
+            <a:lstStyle/>
+            <a:p>
+              <a:r>
+                <a:rPr lang="de-DE" i="1" dirty="0" err="1"/>
+                <a:t>eFMI</a:t>
+              </a:r>
+              <a:r>
+                <a:rPr lang="de-DE" i="1" dirty="0"/>
+                <a:t> </a:t>
+              </a:r>
+              <a:r>
+                <a:rPr lang="de-DE" i="1" dirty="0" smtClean="0"/>
+                <a:t>Standard</a:t>
+              </a:r>
+              <a:endParaRPr lang="de-DE" i="1" dirty="0"/>
+            </a:p>
+          </p:txBody>
+        </p:sp>
+        <p:sp>
+          <p:nvSpPr>
+            <p:cNvPr id="41" name="Textfeld 40">
+              <a:extLst>
+                <a:ext uri="{FF2B5EF4-FFF2-40B4-BE49-F238E27FC236}">
+                  <a16:creationId xmlns:a16="http://schemas.microsoft.com/office/drawing/2014/main" id="{10BD50A2-AE96-4DE9-890D-4D1D8C439686}"/>
+                </a:ext>
+              </a:extLst>
+            </p:cNvPr>
+            <p:cNvSpPr txBox="1"/>
+            <p:nvPr/>
+          </p:nvSpPr>
+          <p:spPr>
+            <a:xfrm>
+              <a:off x="8537984" y="480871"/>
+              <a:ext cx="797157" cy="369332"/>
+            </a:xfrm>
+            <a:prstGeom prst="rect">
+              <a:avLst/>
+            </a:prstGeom>
+            <a:noFill/>
+            <a:ln>
+              <a:solidFill>
+                <a:schemeClr val="tx1"/>
+              </a:solidFill>
+            </a:ln>
+          </p:spPr>
+          <p:txBody>
+            <a:bodyPr wrap="square" rtlCol="0">
+              <a:spAutoFit/>
+            </a:bodyPr>
+            <a:lstStyle/>
+            <a:p>
+              <a:r>
+                <a:rPr lang="de-DE" dirty="0"/>
+                <a:t>FAQ</a:t>
+              </a:r>
+            </a:p>
+          </p:txBody>
+        </p:sp>
+        <p:sp>
+          <p:nvSpPr>
+            <p:cNvPr id="42" name="Textfeld 41">
+              <a:extLst>
+                <a:ext uri="{FF2B5EF4-FFF2-40B4-BE49-F238E27FC236}">
+                  <a16:creationId xmlns:a16="http://schemas.microsoft.com/office/drawing/2014/main" id="{6BC16EBF-775D-41A0-9296-504CE005D37C}"/>
+                </a:ext>
+              </a:extLst>
+            </p:cNvPr>
+            <p:cNvSpPr txBox="1"/>
+            <p:nvPr/>
+          </p:nvSpPr>
+          <p:spPr>
+            <a:xfrm>
+              <a:off x="1684821" y="480871"/>
+              <a:ext cx="1477982" cy="369332"/>
+            </a:xfrm>
+            <a:prstGeom prst="rect">
+              <a:avLst/>
+            </a:prstGeom>
+            <a:noFill/>
+            <a:ln>
+              <a:solidFill>
+                <a:schemeClr val="tx1"/>
+              </a:solidFill>
+            </a:ln>
+          </p:spPr>
+          <p:txBody>
+            <a:bodyPr wrap="square" rtlCol="0">
+              <a:spAutoFit/>
+            </a:bodyPr>
+            <a:lstStyle/>
+            <a:p>
+              <a:r>
+                <a:rPr lang="de-DE" dirty="0" err="1"/>
+                <a:t>Introduction</a:t>
+              </a:r>
+              <a:endParaRPr lang="de-DE" dirty="0"/>
+            </a:p>
+          </p:txBody>
+        </p:sp>
+      </p:grpSp>
+    </p:spTree>
+    <p:extLst>
+      <p:ext uri="{BB962C8B-B14F-4D97-AF65-F5344CB8AC3E}">
+        <p14:creationId xmlns:p14="http://schemas.microsoft.com/office/powerpoint/2010/main" val="1475061712"/>
+      </p:ext>
+    </p:extLst>
+  </p:cSld>
+  <p:clrMapOvr>
+    <a:masterClrMapping/>
+  </p:clrMapOvr>
+</p:sld>
+</file>
+
+<file path=ppt/slides/slide3.xml><?xml version="1.0" encoding="utf-8"?>
+<p:sld xmlns:a="http://schemas.openxmlformats.org/drawingml/2006/main" xmlns:r="http://schemas.openxmlformats.org/officeDocument/2006/relationships" xmlns:p="http://schemas.openxmlformats.org/presentationml/2006/main">
+  <p:cSld>
+    <p:spTree>
+      <p:nvGrpSpPr>
+        <p:cNvPr id="1" name=""/>
+        <p:cNvGrpSpPr/>
+        <p:nvPr/>
+      </p:nvGrpSpPr>
+      <p:grpSpPr>
+        <a:xfrm>
+          <a:off x="0" y="0"/>
+          <a:ext cx="0" cy="0"/>
+          <a:chOff x="0" y="0"/>
+          <a:chExt cx="0" cy="0"/>
+        </a:xfrm>
+      </p:grpSpPr>
       <p:grpSp>
         <p:nvGrpSpPr>
           <p:cNvPr id="18" name="Gruppieren 17">
@@ -4508,11 +5213,7 @@
             </a:r>
             <a:r>
               <a:rPr lang="de-DE" dirty="0" err="1" smtClean="0"/>
-              <a:t>b</a:t>
-            </a:r>
-            <a:r>
-              <a:rPr lang="de-DE" dirty="0" err="1" smtClean="0"/>
-              <a:t>ylaws</a:t>
+              <a:t>bylaws</a:t>
             </a:r>
             <a:r>
               <a:rPr lang="de-DE" dirty="0" smtClean="0"/>
@@ -4759,7 +5460,7 @@
 </p:sld>
 </file>
 
-<file path=ppt/slides/slide3.xml><?xml version="1.0" encoding="utf-8"?>
+<file path=ppt/slides/slide4.xml><?xml version="1.0" encoding="utf-8"?>
 <p:sld xmlns:a="http://schemas.openxmlformats.org/drawingml/2006/main" xmlns:r="http://schemas.openxmlformats.org/officeDocument/2006/relationships" xmlns:p="http://schemas.openxmlformats.org/presentationml/2006/main">
   <p:cSld>
     <p:spTree>
@@ -5988,7 +6689,7 @@
 </p:sld>
 </file>
 
-<file path=ppt/slides/slide4.xml><?xml version="1.0" encoding="utf-8"?>
+<file path=ppt/slides/slide5.xml><?xml version="1.0" encoding="utf-8"?>
 <p:sld xmlns:a="http://schemas.openxmlformats.org/drawingml/2006/main" xmlns:r="http://schemas.openxmlformats.org/officeDocument/2006/relationships" xmlns:p="http://schemas.openxmlformats.org/presentationml/2006/main">
   <p:cSld>
     <p:spTree>
@@ -6525,7 +7226,7 @@
 </p:sld>
 </file>
 
-<file path=ppt/slides/slide5.xml><?xml version="1.0" encoding="utf-8"?>
+<file path=ppt/slides/slide6.xml><?xml version="1.0" encoding="utf-8"?>
 <p:sld xmlns:a="http://schemas.openxmlformats.org/drawingml/2006/main" xmlns:r="http://schemas.openxmlformats.org/officeDocument/2006/relationships" xmlns:p="http://schemas.openxmlformats.org/presentationml/2006/main">
   <p:cSld>
     <p:spTree>
@@ -7776,7 +8477,7 @@
 </p:sld>
 </file>
 
-<file path=ppt/slides/slide6.xml><?xml version="1.0" encoding="utf-8"?>
+<file path=ppt/slides/slide7.xml><?xml version="1.0" encoding="utf-8"?>
 <p:sld xmlns:a="http://schemas.openxmlformats.org/drawingml/2006/main" xmlns:r="http://schemas.openxmlformats.org/officeDocument/2006/relationships" xmlns:p="http://schemas.openxmlformats.org/presentationml/2006/main">
   <p:cSld>
     <p:spTree>
@@ -8488,7 +9189,7 @@
 </p:sld>
 </file>
 
-<file path=ppt/slides/slide7.xml><?xml version="1.0" encoding="utf-8"?>
+<file path=ppt/slides/slide8.xml><?xml version="1.0" encoding="utf-8"?>
 <p:sld xmlns:a="http://schemas.openxmlformats.org/drawingml/2006/main" xmlns:r="http://schemas.openxmlformats.org/officeDocument/2006/relationships" xmlns:p="http://schemas.openxmlformats.org/presentationml/2006/main">
   <p:cSld>
     <p:spTree>
@@ -8727,15 +9428,7 @@
                   <a:srgbClr val="C00000"/>
                 </a:solidFill>
               </a:rPr>
-              <a:t> </a:t>
-            </a:r>
-            <a:r>
-              <a:rPr lang="de-DE" sz="2800" dirty="0">
-                <a:solidFill>
-                  <a:srgbClr val="C00000"/>
-                </a:solidFill>
-              </a:rPr>
-              <a:t>2 </a:t>
+              <a:t> 2 </a:t>
             </a:r>
             <a:r>
               <a:rPr lang="de-DE" sz="2800" dirty="0" err="1">
@@ -9471,7 +10164,7 @@
           </p:nvSpPr>
           <p:spPr>
             <a:xfrm>
-              <a:off x="505513" y="2667000"/>
+              <a:off x="4541804" y="2717032"/>
               <a:ext cx="2793629" cy="954107"/>
             </a:xfrm>
             <a:prstGeom prst="rect">
@@ -9631,7 +10324,7 @@
           </p:nvSpPr>
           <p:spPr>
             <a:xfrm>
-              <a:off x="4436350" y="2667000"/>
+              <a:off x="649470" y="2717032"/>
               <a:ext cx="3038337" cy="954107"/>
             </a:xfrm>
             <a:prstGeom prst="rect">
@@ -9669,11 +10362,6 @@
                 </a:rPr>
                 <a:t>FAQs</a:t>
               </a:r>
-              <a:endParaRPr lang="de-DE" sz="2800" dirty="0">
-                <a:solidFill>
-                  <a:srgbClr val="C00000"/>
-                </a:solidFill>
-              </a:endParaRPr>
             </a:p>
           </p:txBody>
         </p:sp>
@@ -9691,7 +10379,7 @@
 </p:sld>
 </file>
 
-<file path=ppt/slides/slide8.xml><?xml version="1.0" encoding="utf-8"?>
+<file path=ppt/slides/slide9.xml><?xml version="1.0" encoding="utf-8"?>
 <p:sld xmlns:a="http://schemas.openxmlformats.org/drawingml/2006/main" xmlns:r="http://schemas.openxmlformats.org/officeDocument/2006/relationships" xmlns:p="http://schemas.openxmlformats.org/presentationml/2006/main">
   <p:cSld>
     <p:spTree>

</xml_diff>

<commit_message>
Added "Introduction" structure and "eFMI highlights" subpage.
</commit_message>
<xml_diff>
--- a/documentation/2022-03-29_MAP-structure-draft.pptx
+++ b/documentation/2022-03-29_MAP-structure-draft.pptx
@@ -279,7 +279,7 @@
           <a:p>
             <a:fld id="{62F3D5BE-FB1C-4CCB-95C2-71F9060ACFEB}" type="datetimeFigureOut">
               <a:rPr lang="de-DE" smtClean="0"/>
-              <a:t>12.05.2022</a:t>
+              <a:t>16.05.2022</a:t>
             </a:fld>
             <a:endParaRPr lang="de-DE"/>
           </a:p>
@@ -477,7 +477,7 @@
           <a:p>
             <a:fld id="{62F3D5BE-FB1C-4CCB-95C2-71F9060ACFEB}" type="datetimeFigureOut">
               <a:rPr lang="de-DE" smtClean="0"/>
-              <a:t>12.05.2022</a:t>
+              <a:t>16.05.2022</a:t>
             </a:fld>
             <a:endParaRPr lang="de-DE"/>
           </a:p>
@@ -685,7 +685,7 @@
           <a:p>
             <a:fld id="{62F3D5BE-FB1C-4CCB-95C2-71F9060ACFEB}" type="datetimeFigureOut">
               <a:rPr lang="de-DE" smtClean="0"/>
-              <a:t>12.05.2022</a:t>
+              <a:t>16.05.2022</a:t>
             </a:fld>
             <a:endParaRPr lang="de-DE"/>
           </a:p>
@@ -883,7 +883,7 @@
           <a:p>
             <a:fld id="{62F3D5BE-FB1C-4CCB-95C2-71F9060ACFEB}" type="datetimeFigureOut">
               <a:rPr lang="de-DE" smtClean="0"/>
-              <a:t>12.05.2022</a:t>
+              <a:t>16.05.2022</a:t>
             </a:fld>
             <a:endParaRPr lang="de-DE"/>
           </a:p>
@@ -1158,7 +1158,7 @@
           <a:p>
             <a:fld id="{62F3D5BE-FB1C-4CCB-95C2-71F9060ACFEB}" type="datetimeFigureOut">
               <a:rPr lang="de-DE" smtClean="0"/>
-              <a:t>12.05.2022</a:t>
+              <a:t>16.05.2022</a:t>
             </a:fld>
             <a:endParaRPr lang="de-DE"/>
           </a:p>
@@ -1423,7 +1423,7 @@
           <a:p>
             <a:fld id="{62F3D5BE-FB1C-4CCB-95C2-71F9060ACFEB}" type="datetimeFigureOut">
               <a:rPr lang="de-DE" smtClean="0"/>
-              <a:t>12.05.2022</a:t>
+              <a:t>16.05.2022</a:t>
             </a:fld>
             <a:endParaRPr lang="de-DE"/>
           </a:p>
@@ -1835,7 +1835,7 @@
           <a:p>
             <a:fld id="{62F3D5BE-FB1C-4CCB-95C2-71F9060ACFEB}" type="datetimeFigureOut">
               <a:rPr lang="de-DE" smtClean="0"/>
-              <a:t>12.05.2022</a:t>
+              <a:t>16.05.2022</a:t>
             </a:fld>
             <a:endParaRPr lang="de-DE"/>
           </a:p>
@@ -1976,7 +1976,7 @@
           <a:p>
             <a:fld id="{62F3D5BE-FB1C-4CCB-95C2-71F9060ACFEB}" type="datetimeFigureOut">
               <a:rPr lang="de-DE" smtClean="0"/>
-              <a:t>12.05.2022</a:t>
+              <a:t>16.05.2022</a:t>
             </a:fld>
             <a:endParaRPr lang="de-DE"/>
           </a:p>
@@ -2089,7 +2089,7 @@
           <a:p>
             <a:fld id="{62F3D5BE-FB1C-4CCB-95C2-71F9060ACFEB}" type="datetimeFigureOut">
               <a:rPr lang="de-DE" smtClean="0"/>
-              <a:t>12.05.2022</a:t>
+              <a:t>16.05.2022</a:t>
             </a:fld>
             <a:endParaRPr lang="de-DE"/>
           </a:p>
@@ -2400,7 +2400,7 @@
           <a:p>
             <a:fld id="{62F3D5BE-FB1C-4CCB-95C2-71F9060ACFEB}" type="datetimeFigureOut">
               <a:rPr lang="de-DE" smtClean="0"/>
-              <a:t>12.05.2022</a:t>
+              <a:t>16.05.2022</a:t>
             </a:fld>
             <a:endParaRPr lang="de-DE"/>
           </a:p>
@@ -2688,7 +2688,7 @@
           <a:p>
             <a:fld id="{62F3D5BE-FB1C-4CCB-95C2-71F9060ACFEB}" type="datetimeFigureOut">
               <a:rPr lang="de-DE" smtClean="0"/>
-              <a:t>12.05.2022</a:t>
+              <a:t>16.05.2022</a:t>
             </a:fld>
             <a:endParaRPr lang="de-DE"/>
           </a:p>
@@ -2929,7 +2929,7 @@
           <a:p>
             <a:fld id="{62F3D5BE-FB1C-4CCB-95C2-71F9060ACFEB}" type="datetimeFigureOut">
               <a:rPr lang="de-DE" smtClean="0"/>
-              <a:t>12.05.2022</a:t>
+              <a:t>16.05.2022</a:t>
             </a:fld>
             <a:endParaRPr lang="de-DE"/>
           </a:p>
@@ -3384,7 +3384,7 @@
                   </a:schemeClr>
                 </a:solidFill>
               </a:rPr>
-              <a:t>2022-05-12</a:t>
+              <a:t>2022-05-16</a:t>
             </a:r>
             <a:endParaRPr lang="de-DE" dirty="0">
               <a:solidFill>
@@ -5001,7 +5001,7 @@
           <p:spPr>
             <a:xfrm>
               <a:off x="8281186" y="2454573"/>
-              <a:ext cx="3429619" cy="523220"/>
+              <a:ext cx="3429619" cy="954107"/>
             </a:xfrm>
             <a:prstGeom prst="rect">
               <a:avLst/>
@@ -5015,12 +5015,46 @@
             <a:lstStyle/>
             <a:p>
               <a:r>
-                <a:rPr lang="en-US" sz="2800" dirty="0" smtClean="0">
+                <a:rPr lang="sv-SE" sz="2800" dirty="0">
                   <a:solidFill>
                     <a:srgbClr val="C00000"/>
                   </a:solidFill>
                 </a:rPr>
-                <a:t>Community</a:t>
+                <a:t>Project </a:t>
+              </a:r>
+              <a:r>
+                <a:rPr lang="sv-SE" sz="2800" dirty="0" err="1" smtClean="0">
+                  <a:solidFill>
+                    <a:srgbClr val="C00000"/>
+                  </a:solidFill>
+                </a:rPr>
+                <a:t>organization</a:t>
+              </a:r>
+              <a:r>
+                <a:rPr lang="sv-SE" sz="2800" dirty="0" smtClean="0">
+                  <a:solidFill>
+                    <a:srgbClr val="C00000"/>
+                  </a:solidFill>
+                </a:rPr>
+                <a:t> &amp;</a:t>
+              </a:r>
+            </a:p>
+            <a:p>
+              <a:r>
+                <a:rPr lang="sv-SE" sz="2800" dirty="0" err="1">
+                  <a:solidFill>
+                    <a:srgbClr val="C00000"/>
+                  </a:solidFill>
+                </a:rPr>
+                <a:t>c</a:t>
+              </a:r>
+              <a:r>
+                <a:rPr lang="sv-SE" sz="2800" dirty="0" err="1" smtClean="0">
+                  <a:solidFill>
+                    <a:srgbClr val="C00000"/>
+                  </a:solidFill>
+                </a:rPr>
+                <a:t>ommunity</a:t>
               </a:r>
               <a:endParaRPr lang="de-DE" sz="2800" dirty="0">
                 <a:solidFill>
@@ -5098,7 +5132,7 @@
         <p:spPr>
           <a:xfrm>
             <a:off x="4318591" y="1949834"/>
-            <a:ext cx="3038337" cy="954107"/>
+            <a:ext cx="3038337" cy="523220"/>
           </a:xfrm>
           <a:prstGeom prst="rect">
             <a:avLst/>
@@ -5112,20 +5146,12 @@
           <a:lstStyle/>
           <a:p>
             <a:r>
-              <a:rPr lang="sv-SE" sz="2800" dirty="0" smtClean="0">
-                <a:solidFill>
-                  <a:srgbClr val="C00000"/>
-                </a:solidFill>
-              </a:rPr>
-              <a:t>Project </a:t>
-            </a:r>
-            <a:r>
               <a:rPr lang="sv-SE" sz="2800" dirty="0" err="1" smtClean="0">
                 <a:solidFill>
                   <a:srgbClr val="C00000"/>
                 </a:solidFill>
               </a:rPr>
-              <a:t>organization</a:t>
+              <a:t>Highlights</a:t>
             </a:r>
             <a:endParaRPr lang="de-DE" sz="2800" dirty="0">
               <a:solidFill>
@@ -5150,7 +5176,7 @@
         <p:spPr>
           <a:xfrm>
             <a:off x="4360993" y="2873078"/>
-            <a:ext cx="2948443" cy="923330"/>
+            <a:ext cx="2948443" cy="646331"/>
           </a:xfrm>
           <a:prstGeom prst="rect">
             <a:avLst/>
@@ -5164,56 +5190,8 @@
           <a:lstStyle/>
           <a:p>
             <a:r>
-              <a:rPr lang="de-DE" dirty="0"/>
-              <a:t>More </a:t>
-            </a:r>
-            <a:r>
-              <a:rPr lang="de-DE" dirty="0" err="1"/>
-              <a:t>detailed</a:t>
-            </a:r>
-            <a:r>
-              <a:rPr lang="de-DE" dirty="0"/>
-              <a:t> </a:t>
-            </a:r>
-            <a:r>
-              <a:rPr lang="de-DE" dirty="0" err="1"/>
-              <a:t>information</a:t>
-            </a:r>
-            <a:r>
-              <a:rPr lang="de-DE" dirty="0"/>
-              <a:t> </a:t>
-            </a:r>
-            <a:r>
-              <a:rPr lang="de-DE" dirty="0" err="1"/>
-              <a:t>about</a:t>
-            </a:r>
-            <a:r>
-              <a:rPr lang="de-DE" dirty="0"/>
-              <a:t> </a:t>
-            </a:r>
-            <a:r>
-              <a:rPr lang="de-DE" dirty="0" err="1"/>
-              <a:t>the</a:t>
-            </a:r>
-            <a:r>
-              <a:rPr lang="de-DE" dirty="0"/>
-              <a:t> </a:t>
-            </a:r>
-            <a:r>
               <a:rPr lang="de-DE" dirty="0" err="1" smtClean="0"/>
-              <a:t>project</a:t>
-            </a:r>
-            <a:r>
-              <a:rPr lang="de-DE" dirty="0" smtClean="0"/>
-              <a:t>, e.g.,</a:t>
-            </a:r>
-            <a:r>
-              <a:rPr lang="de-DE" dirty="0"/>
-              <a:t> </a:t>
-            </a:r>
-            <a:r>
-              <a:rPr lang="de-DE" dirty="0" err="1" smtClean="0"/>
-              <a:t>bylaws</a:t>
+              <a:t>Overview</a:t>
             </a:r>
             <a:r>
               <a:rPr lang="de-DE" dirty="0" smtClean="0"/>
@@ -5221,7 +5199,7 @@
             </a:r>
             <a:r>
               <a:rPr lang="de-DE" dirty="0" err="1" smtClean="0"/>
-              <a:t>and</a:t>
+              <a:t>of</a:t>
             </a:r>
             <a:r>
               <a:rPr lang="de-DE" dirty="0" smtClean="0"/>
@@ -5229,7 +5207,7 @@
             </a:r>
             <a:r>
               <a:rPr lang="de-DE" dirty="0" err="1" smtClean="0"/>
-              <a:t>current</a:t>
+              <a:t>highlight</a:t>
             </a:r>
             <a:r>
               <a:rPr lang="de-DE" dirty="0" smtClean="0"/>
@@ -5237,7 +5215,27 @@
             </a:r>
             <a:r>
               <a:rPr lang="de-DE" dirty="0" err="1" smtClean="0"/>
-              <a:t>members</a:t>
+              <a:t>of</a:t>
+            </a:r>
+            <a:r>
+              <a:rPr lang="de-DE" dirty="0" smtClean="0"/>
+              <a:t> </a:t>
+            </a:r>
+            <a:r>
+              <a:rPr lang="de-DE" dirty="0" err="1" smtClean="0"/>
+              <a:t>the</a:t>
+            </a:r>
+            <a:r>
+              <a:rPr lang="de-DE" dirty="0" smtClean="0"/>
+              <a:t> </a:t>
+            </a:r>
+            <a:r>
+              <a:rPr lang="de-DE" i="1" dirty="0" err="1" smtClean="0"/>
+              <a:t>eFMI</a:t>
+            </a:r>
+            <a:r>
+              <a:rPr lang="de-DE" i="1" dirty="0" smtClean="0"/>
+              <a:t> Standard</a:t>
             </a:r>
             <a:r>
               <a:rPr lang="de-DE" dirty="0" smtClean="0"/>
@@ -5384,32 +5382,80 @@
           <a:lstStyle/>
           <a:p>
             <a:r>
+              <a:rPr lang="de-DE" dirty="0" err="1" smtClean="0"/>
+              <a:t>About</a:t>
+            </a:r>
+            <a:r>
+              <a:rPr lang="de-DE" dirty="0" smtClean="0"/>
+              <a:t> </a:t>
+            </a:r>
+            <a:r>
               <a:rPr lang="de-DE" dirty="0" err="1"/>
-              <a:t>How</a:t>
+              <a:t>the</a:t>
             </a:r>
             <a:r>
               <a:rPr lang="de-DE" dirty="0"/>
               <a:t> </a:t>
             </a:r>
             <a:r>
-              <a:rPr lang="de-DE" dirty="0" err="1"/>
+              <a:rPr lang="de-DE" dirty="0" err="1" smtClean="0"/>
+              <a:t>project</a:t>
+            </a:r>
+            <a:r>
+              <a:rPr lang="de-DE" dirty="0" smtClean="0"/>
+              <a:t> (</a:t>
+            </a:r>
+            <a:r>
+              <a:rPr lang="de-DE" dirty="0" err="1" smtClean="0"/>
+              <a:t>bylaws</a:t>
+            </a:r>
+            <a:r>
+              <a:rPr lang="de-DE" dirty="0" smtClean="0"/>
+              <a:t>, </a:t>
+            </a:r>
+            <a:r>
+              <a:rPr lang="de-DE" dirty="0" err="1" smtClean="0"/>
+              <a:t>current</a:t>
+            </a:r>
+            <a:r>
+              <a:rPr lang="de-DE" dirty="0" smtClean="0"/>
+              <a:t> </a:t>
+            </a:r>
+            <a:r>
+              <a:rPr lang="de-DE" dirty="0" err="1" smtClean="0"/>
+              <a:t>members</a:t>
+            </a:r>
+            <a:r>
+              <a:rPr lang="de-DE" dirty="0"/>
+              <a:t>)</a:t>
+            </a:r>
+            <a:r>
+              <a:rPr lang="de-DE" dirty="0" smtClean="0"/>
+              <a:t>, </a:t>
+            </a:r>
+            <a:r>
+              <a:rPr lang="de-DE" dirty="0" err="1" smtClean="0"/>
+              <a:t>how</a:t>
+            </a:r>
+            <a:r>
+              <a:rPr lang="de-DE" dirty="0" smtClean="0"/>
+              <a:t> </a:t>
+            </a:r>
+            <a:r>
+              <a:rPr lang="de-DE" dirty="0" err="1" smtClean="0"/>
               <a:t>to</a:t>
             </a:r>
             <a:r>
-              <a:rPr lang="de-DE" dirty="0"/>
+              <a:rPr lang="de-DE" dirty="0" smtClean="0"/>
               <a:t> </a:t>
             </a:r>
             <a:r>
-              <a:rPr lang="de-DE" dirty="0" err="1"/>
+              <a:rPr lang="de-DE" dirty="0" err="1" smtClean="0"/>
               <a:t>get</a:t>
             </a:r>
             <a:r>
-              <a:rPr lang="de-DE" dirty="0"/>
-              <a:t> </a:t>
-            </a:r>
-            <a:r>
               <a:rPr lang="de-DE" dirty="0" smtClean="0"/>
-              <a:t>in </a:t>
+              <a:t> in </a:t>
             </a:r>
             <a:r>
               <a:rPr lang="de-DE" dirty="0" err="1" smtClean="0"/>
@@ -5417,27 +5463,19 @@
             </a:r>
             <a:r>
               <a:rPr lang="de-DE" dirty="0" smtClean="0"/>
-              <a:t>, </a:t>
-            </a:r>
-            <a:r>
-              <a:rPr lang="en-US" dirty="0" smtClean="0"/>
-              <a:t>contribute </a:t>
-            </a:r>
-            <a:r>
-              <a:rPr lang="en-US" dirty="0"/>
-              <a:t>and </a:t>
-            </a:r>
-            <a:r>
-              <a:rPr lang="en-US" dirty="0" smtClean="0"/>
-              <a:t>become </a:t>
-            </a:r>
-            <a:r>
-              <a:rPr lang="en-US" dirty="0"/>
-              <a:t>a </a:t>
-            </a:r>
-            <a:r>
-              <a:rPr lang="en-US" dirty="0" smtClean="0"/>
-              <a:t>member</a:t>
+              <a:t> </a:t>
+            </a:r>
+            <a:r>
+              <a:rPr lang="de-DE" dirty="0" err="1" smtClean="0"/>
+              <a:t>and</a:t>
+            </a:r>
+            <a:r>
+              <a:rPr lang="de-DE" dirty="0" smtClean="0"/>
+              <a:t> </a:t>
+            </a:r>
+            <a:r>
+              <a:rPr lang="de-DE" dirty="0" err="1" smtClean="0"/>
+              <a:t>contribute</a:t>
             </a:r>
             <a:r>
               <a:rPr lang="de-DE" dirty="0" smtClean="0"/>

</xml_diff>

<commit_message>
Work on "Introduction: About eFMI".
</commit_message>
<xml_diff>
--- a/documentation/2022-03-29_MAP-structure-draft.pptx
+++ b/documentation/2022-03-29_MAP-structure-draft.pptx
@@ -279,7 +279,7 @@
           <a:p>
             <a:fld id="{62F3D5BE-FB1C-4CCB-95C2-71F9060ACFEB}" type="datetimeFigureOut">
               <a:rPr lang="de-DE" smtClean="0"/>
-              <a:t>16.05.2022</a:t>
+              <a:t>17.05.2022</a:t>
             </a:fld>
             <a:endParaRPr lang="de-DE"/>
           </a:p>
@@ -477,7 +477,7 @@
           <a:p>
             <a:fld id="{62F3D5BE-FB1C-4CCB-95C2-71F9060ACFEB}" type="datetimeFigureOut">
               <a:rPr lang="de-DE" smtClean="0"/>
-              <a:t>16.05.2022</a:t>
+              <a:t>17.05.2022</a:t>
             </a:fld>
             <a:endParaRPr lang="de-DE"/>
           </a:p>
@@ -685,7 +685,7 @@
           <a:p>
             <a:fld id="{62F3D5BE-FB1C-4CCB-95C2-71F9060ACFEB}" type="datetimeFigureOut">
               <a:rPr lang="de-DE" smtClean="0"/>
-              <a:t>16.05.2022</a:t>
+              <a:t>17.05.2022</a:t>
             </a:fld>
             <a:endParaRPr lang="de-DE"/>
           </a:p>
@@ -883,7 +883,7 @@
           <a:p>
             <a:fld id="{62F3D5BE-FB1C-4CCB-95C2-71F9060ACFEB}" type="datetimeFigureOut">
               <a:rPr lang="de-DE" smtClean="0"/>
-              <a:t>16.05.2022</a:t>
+              <a:t>17.05.2022</a:t>
             </a:fld>
             <a:endParaRPr lang="de-DE"/>
           </a:p>
@@ -1158,7 +1158,7 @@
           <a:p>
             <a:fld id="{62F3D5BE-FB1C-4CCB-95C2-71F9060ACFEB}" type="datetimeFigureOut">
               <a:rPr lang="de-DE" smtClean="0"/>
-              <a:t>16.05.2022</a:t>
+              <a:t>17.05.2022</a:t>
             </a:fld>
             <a:endParaRPr lang="de-DE"/>
           </a:p>
@@ -1423,7 +1423,7 @@
           <a:p>
             <a:fld id="{62F3D5BE-FB1C-4CCB-95C2-71F9060ACFEB}" type="datetimeFigureOut">
               <a:rPr lang="de-DE" smtClean="0"/>
-              <a:t>16.05.2022</a:t>
+              <a:t>17.05.2022</a:t>
             </a:fld>
             <a:endParaRPr lang="de-DE"/>
           </a:p>
@@ -1835,7 +1835,7 @@
           <a:p>
             <a:fld id="{62F3D5BE-FB1C-4CCB-95C2-71F9060ACFEB}" type="datetimeFigureOut">
               <a:rPr lang="de-DE" smtClean="0"/>
-              <a:t>16.05.2022</a:t>
+              <a:t>17.05.2022</a:t>
             </a:fld>
             <a:endParaRPr lang="de-DE"/>
           </a:p>
@@ -1976,7 +1976,7 @@
           <a:p>
             <a:fld id="{62F3D5BE-FB1C-4CCB-95C2-71F9060ACFEB}" type="datetimeFigureOut">
               <a:rPr lang="de-DE" smtClean="0"/>
-              <a:t>16.05.2022</a:t>
+              <a:t>17.05.2022</a:t>
             </a:fld>
             <a:endParaRPr lang="de-DE"/>
           </a:p>
@@ -2089,7 +2089,7 @@
           <a:p>
             <a:fld id="{62F3D5BE-FB1C-4CCB-95C2-71F9060ACFEB}" type="datetimeFigureOut">
               <a:rPr lang="de-DE" smtClean="0"/>
-              <a:t>16.05.2022</a:t>
+              <a:t>17.05.2022</a:t>
             </a:fld>
             <a:endParaRPr lang="de-DE"/>
           </a:p>
@@ -2400,7 +2400,7 @@
           <a:p>
             <a:fld id="{62F3D5BE-FB1C-4CCB-95C2-71F9060ACFEB}" type="datetimeFigureOut">
               <a:rPr lang="de-DE" smtClean="0"/>
-              <a:t>16.05.2022</a:t>
+              <a:t>17.05.2022</a:t>
             </a:fld>
             <a:endParaRPr lang="de-DE"/>
           </a:p>
@@ -2688,7 +2688,7 @@
           <a:p>
             <a:fld id="{62F3D5BE-FB1C-4CCB-95C2-71F9060ACFEB}" type="datetimeFigureOut">
               <a:rPr lang="de-DE" smtClean="0"/>
-              <a:t>16.05.2022</a:t>
+              <a:t>17.05.2022</a:t>
             </a:fld>
             <a:endParaRPr lang="de-DE"/>
           </a:p>
@@ -2929,7 +2929,7 @@
           <a:p>
             <a:fld id="{62F3D5BE-FB1C-4CCB-95C2-71F9060ACFEB}" type="datetimeFigureOut">
               <a:rPr lang="de-DE" smtClean="0"/>
-              <a:t>16.05.2022</a:t>
+              <a:t>17.05.2022</a:t>
             </a:fld>
             <a:endParaRPr lang="de-DE"/>
           </a:p>
@@ -10448,7 +10448,7 @@
         </p:nvGrpSpPr>
         <p:grpSpPr>
           <a:xfrm>
-            <a:off x="4429953" y="1842388"/>
+            <a:off x="867292" y="1907042"/>
             <a:ext cx="3689134" cy="2290440"/>
             <a:chOff x="2374952" y="4313694"/>
             <a:chExt cx="3689134" cy="2290440"/>
@@ -10655,7 +10655,7 @@
         </p:nvGrpSpPr>
         <p:grpSpPr>
           <a:xfrm>
-            <a:off x="529455" y="1842388"/>
+            <a:off x="4887934" y="1907042"/>
             <a:ext cx="3689134" cy="2290440"/>
             <a:chOff x="670032" y="4285046"/>
             <a:chExt cx="3689134" cy="2290440"/>

</xml_diff>